<commit_message>
fixed a minor ommission in Lecture 2 powerpoint
</commit_message>
<xml_diff>
--- a/Lecture 2/lecture2.pptx
+++ b/Lecture 2/lecture2.pptx
@@ -166,7 +166,7 @@
   </p:defaultTextStyle>
   <p:extLst>
     <p:ext uri="{EFAFB233-063F-42B5-8137-9DF3F51BA10A}">
-      <p15:sldGuideLst xmlns:p15="http://schemas.microsoft.com/office/powerpoint/2012/main" xmlns="">
+      <p15:sldGuideLst xmlns="" xmlns:p15="http://schemas.microsoft.com/office/powerpoint/2012/main">
         <p15:guide id="1" orient="horz" pos="2160" userDrawn="1">
           <p15:clr>
             <a:srgbClr val="A4A3A4"/>
@@ -180,7 +180,7 @@
       </p15:sldGuideLst>
     </p:ext>
     <p:ext uri="{2D200454-40CA-4A62-9FC3-DE9A4176ACB9}">
-      <p15:notesGuideLst xmlns:p15="http://schemas.microsoft.com/office/powerpoint/2012/main" xmlns="">
+      <p15:notesGuideLst xmlns="" xmlns:p15="http://schemas.microsoft.com/office/powerpoint/2012/main">
         <p15:guide id="1" orient="horz" pos="2880">
           <p15:clr>
             <a:srgbClr val="A4A3A4"/>
@@ -280,7 +280,7 @@
             <a:fld id="{B4B40DF5-17F0-43C5-A7AE-65A758E8AB63}" type="datetimeFigureOut">
               <a:rPr lang="nl-NL" smtClean="0"/>
               <a:pPr/>
-              <a:t>2/9/21</a:t>
+              <a:t>2/16/21</a:t>
             </a:fld>
             <a:endParaRPr lang="nl-NL"/>
           </a:p>
@@ -446,7 +446,7 @@
           <a:p>
             <a:fld id="{A93D6BD4-2A44-460F-8349-CDAFC499EC45}" type="datetimeFigureOut">
               <a:rPr lang="en-US" smtClean="0"/>
-              <a:t>2/9/21</a:t>
+              <a:t>2/16/21</a:t>
             </a:fld>
             <a:endParaRPr lang="en-US"/>
           </a:p>
@@ -3633,13 +3633,6 @@
               </a:rPr>
               <a:t>members of objects by using dot syntax</a:t>
             </a:r>
-            <a:endParaRPr lang="en-US" sz="1600" dirty="0">
-              <a:solidFill>
-                <a:schemeClr val="tx1"/>
-              </a:solidFill>
-              <a:latin typeface="Courier New" panose="02070309020205020404" pitchFamily="49" charset="0"/>
-              <a:cs typeface="Courier New" panose="02070309020205020404" pitchFamily="49" charset="0"/>
-            </a:endParaRPr>
           </a:p>
         </p:txBody>
       </p:sp>
@@ -5871,10 +5864,6 @@
               </a:rPr>
               <a:t> = [5, 10, 20] is a complex/variable expression</a:t>
             </a:r>
-            <a:endParaRPr lang="en-US" sz="1600" dirty="0">
-              <a:latin typeface="Courier New" pitchFamily="49" charset="0"/>
-              <a:cs typeface="Courier New" pitchFamily="49" charset="0"/>
-            </a:endParaRPr>
           </a:p>
         </p:txBody>
       </p:sp>
@@ -6500,28 +6489,28 @@
                 <a:gridCol w="2016522">
                   <a:extLst>
                     <a:ext uri="{9D8B030D-6E8A-4147-A177-3AD203B41FA5}">
-                      <a16:colId xmlns:a16="http://schemas.microsoft.com/office/drawing/2014/main" xmlns="" val="20000"/>
+                      <a16:colId xmlns="" xmlns:a16="http://schemas.microsoft.com/office/drawing/2014/main" val="20000"/>
                     </a:ext>
                   </a:extLst>
                 </a:gridCol>
                 <a:gridCol w="2016522">
                   <a:extLst>
                     <a:ext uri="{9D8B030D-6E8A-4147-A177-3AD203B41FA5}">
-                      <a16:colId xmlns:a16="http://schemas.microsoft.com/office/drawing/2014/main" xmlns="" val="20001"/>
+                      <a16:colId xmlns="" xmlns:a16="http://schemas.microsoft.com/office/drawing/2014/main" val="20001"/>
                     </a:ext>
                   </a:extLst>
                 </a:gridCol>
                 <a:gridCol w="2016522">
                   <a:extLst>
                     <a:ext uri="{9D8B030D-6E8A-4147-A177-3AD203B41FA5}">
-                      <a16:colId xmlns:a16="http://schemas.microsoft.com/office/drawing/2014/main" xmlns="" val="20002"/>
+                      <a16:colId xmlns="" xmlns:a16="http://schemas.microsoft.com/office/drawing/2014/main" val="20002"/>
                     </a:ext>
                   </a:extLst>
                 </a:gridCol>
                 <a:gridCol w="2016522">
                   <a:extLst>
                     <a:ext uri="{9D8B030D-6E8A-4147-A177-3AD203B41FA5}">
-                      <a16:colId xmlns:a16="http://schemas.microsoft.com/office/drawing/2014/main" xmlns="" val="20003"/>
+                      <a16:colId xmlns="" xmlns:a16="http://schemas.microsoft.com/office/drawing/2014/main" val="20003"/>
                     </a:ext>
                   </a:extLst>
                 </a:gridCol>
@@ -6685,7 +6674,7 @@
                 </a:tc>
                 <a:extLst>
                   <a:ext uri="{0D108BD9-81ED-4DB2-BD59-A6C34878D82A}">
-                    <a16:rowId xmlns:a16="http://schemas.microsoft.com/office/drawing/2014/main" xmlns="" val="10000"/>
+                    <a16:rowId xmlns="" xmlns:a16="http://schemas.microsoft.com/office/drawing/2014/main" val="10000"/>
                   </a:ext>
                 </a:extLst>
               </a:tr>
@@ -6824,7 +6813,7 @@
                 </a:tc>
                 <a:extLst>
                   <a:ext uri="{0D108BD9-81ED-4DB2-BD59-A6C34878D82A}">
-                    <a16:rowId xmlns:a16="http://schemas.microsoft.com/office/drawing/2014/main" xmlns="" val="10001"/>
+                    <a16:rowId xmlns="" xmlns:a16="http://schemas.microsoft.com/office/drawing/2014/main" val="10001"/>
                   </a:ext>
                 </a:extLst>
               </a:tr>
@@ -6963,7 +6952,7 @@
                 </a:tc>
                 <a:extLst>
                   <a:ext uri="{0D108BD9-81ED-4DB2-BD59-A6C34878D82A}">
-                    <a16:rowId xmlns:a16="http://schemas.microsoft.com/office/drawing/2014/main" xmlns="" val="10002"/>
+                    <a16:rowId xmlns="" xmlns:a16="http://schemas.microsoft.com/office/drawing/2014/main" val="10002"/>
                   </a:ext>
                 </a:extLst>
               </a:tr>
@@ -7102,7 +7091,7 @@
                 </a:tc>
                 <a:extLst>
                   <a:ext uri="{0D108BD9-81ED-4DB2-BD59-A6C34878D82A}">
-                    <a16:rowId xmlns:a16="http://schemas.microsoft.com/office/drawing/2014/main" xmlns="" val="10003"/>
+                    <a16:rowId xmlns="" xmlns:a16="http://schemas.microsoft.com/office/drawing/2014/main" val="10003"/>
                   </a:ext>
                 </a:extLst>
               </a:tr>
@@ -7241,7 +7230,7 @@
                 </a:tc>
                 <a:extLst>
                   <a:ext uri="{0D108BD9-81ED-4DB2-BD59-A6C34878D82A}">
-                    <a16:rowId xmlns:a16="http://schemas.microsoft.com/office/drawing/2014/main" xmlns="" val="10004"/>
+                    <a16:rowId xmlns="" xmlns:a16="http://schemas.microsoft.com/office/drawing/2014/main" val="10004"/>
                   </a:ext>
                 </a:extLst>
               </a:tr>
@@ -7380,7 +7369,7 @@
                 </a:tc>
                 <a:extLst>
                   <a:ext uri="{0D108BD9-81ED-4DB2-BD59-A6C34878D82A}">
-                    <a16:rowId xmlns:a16="http://schemas.microsoft.com/office/drawing/2014/main" xmlns="" val="10005"/>
+                    <a16:rowId xmlns="" xmlns:a16="http://schemas.microsoft.com/office/drawing/2014/main" val="10005"/>
                   </a:ext>
                 </a:extLst>
               </a:tr>
@@ -7546,7 +7535,7 @@
                 </a:tc>
                 <a:extLst>
                   <a:ext uri="{0D108BD9-81ED-4DB2-BD59-A6C34878D82A}">
-                    <a16:rowId xmlns:a16="http://schemas.microsoft.com/office/drawing/2014/main" xmlns="" val="10006"/>
+                    <a16:rowId xmlns="" xmlns:a16="http://schemas.microsoft.com/office/drawing/2014/main" val="10006"/>
                   </a:ext>
                 </a:extLst>
               </a:tr>
@@ -7690,28 +7679,28 @@
                 <a:gridCol w="2016522">
                   <a:extLst>
                     <a:ext uri="{9D8B030D-6E8A-4147-A177-3AD203B41FA5}">
-                      <a16:colId xmlns:a16="http://schemas.microsoft.com/office/drawing/2014/main" xmlns="" val="20000"/>
+                      <a16:colId xmlns="" xmlns:a16="http://schemas.microsoft.com/office/drawing/2014/main" val="20000"/>
                     </a:ext>
                   </a:extLst>
                 </a:gridCol>
                 <a:gridCol w="2016522">
                   <a:extLst>
                     <a:ext uri="{9D8B030D-6E8A-4147-A177-3AD203B41FA5}">
-                      <a16:colId xmlns:a16="http://schemas.microsoft.com/office/drawing/2014/main" xmlns="" val="20001"/>
+                      <a16:colId xmlns="" xmlns:a16="http://schemas.microsoft.com/office/drawing/2014/main" val="20001"/>
                     </a:ext>
                   </a:extLst>
                 </a:gridCol>
                 <a:gridCol w="2016522">
                   <a:extLst>
                     <a:ext uri="{9D8B030D-6E8A-4147-A177-3AD203B41FA5}">
-                      <a16:colId xmlns:a16="http://schemas.microsoft.com/office/drawing/2014/main" xmlns="" val="20002"/>
+                      <a16:colId xmlns="" xmlns:a16="http://schemas.microsoft.com/office/drawing/2014/main" val="20002"/>
                     </a:ext>
                   </a:extLst>
                 </a:gridCol>
                 <a:gridCol w="2016522">
                   <a:extLst>
                     <a:ext uri="{9D8B030D-6E8A-4147-A177-3AD203B41FA5}">
-                      <a16:colId xmlns:a16="http://schemas.microsoft.com/office/drawing/2014/main" xmlns="" val="20003"/>
+                      <a16:colId xmlns="" xmlns:a16="http://schemas.microsoft.com/office/drawing/2014/main" val="20003"/>
                     </a:ext>
                   </a:extLst>
                 </a:gridCol>
@@ -7851,7 +7840,7 @@
                 </a:tc>
                 <a:extLst>
                   <a:ext uri="{0D108BD9-81ED-4DB2-BD59-A6C34878D82A}">
-                    <a16:rowId xmlns:a16="http://schemas.microsoft.com/office/drawing/2014/main" xmlns="" val="10000"/>
+                    <a16:rowId xmlns="" xmlns:a16="http://schemas.microsoft.com/office/drawing/2014/main" val="10000"/>
                   </a:ext>
                 </a:extLst>
               </a:tr>
@@ -7990,7 +7979,7 @@
                 </a:tc>
                 <a:extLst>
                   <a:ext uri="{0D108BD9-81ED-4DB2-BD59-A6C34878D82A}">
-                    <a16:rowId xmlns:a16="http://schemas.microsoft.com/office/drawing/2014/main" xmlns="" val="10001"/>
+                    <a16:rowId xmlns="" xmlns:a16="http://schemas.microsoft.com/office/drawing/2014/main" val="10001"/>
                   </a:ext>
                 </a:extLst>
               </a:tr>
@@ -8129,7 +8118,7 @@
                 </a:tc>
                 <a:extLst>
                   <a:ext uri="{0D108BD9-81ED-4DB2-BD59-A6C34878D82A}">
-                    <a16:rowId xmlns:a16="http://schemas.microsoft.com/office/drawing/2014/main" xmlns="" val="10002"/>
+                    <a16:rowId xmlns="" xmlns:a16="http://schemas.microsoft.com/office/drawing/2014/main" val="10002"/>
                   </a:ext>
                 </a:extLst>
               </a:tr>
@@ -8268,7 +8257,7 @@
                 </a:tc>
                 <a:extLst>
                   <a:ext uri="{0D108BD9-81ED-4DB2-BD59-A6C34878D82A}">
-                    <a16:rowId xmlns:a16="http://schemas.microsoft.com/office/drawing/2014/main" xmlns="" val="10003"/>
+                    <a16:rowId xmlns="" xmlns:a16="http://schemas.microsoft.com/office/drawing/2014/main" val="10003"/>
                   </a:ext>
                 </a:extLst>
               </a:tr>
@@ -8415,7 +8404,7 @@
                 </a:tc>
                 <a:extLst>
                   <a:ext uri="{0D108BD9-81ED-4DB2-BD59-A6C34878D82A}">
-                    <a16:rowId xmlns:a16="http://schemas.microsoft.com/office/drawing/2014/main" xmlns="" val="10004"/>
+                    <a16:rowId xmlns="" xmlns:a16="http://schemas.microsoft.com/office/drawing/2014/main" val="10004"/>
                   </a:ext>
                 </a:extLst>
               </a:tr>
@@ -8554,7 +8543,7 @@
                 </a:tc>
                 <a:extLst>
                   <a:ext uri="{0D108BD9-81ED-4DB2-BD59-A6C34878D82A}">
-                    <a16:rowId xmlns:a16="http://schemas.microsoft.com/office/drawing/2014/main" xmlns="" val="10005"/>
+                    <a16:rowId xmlns="" xmlns:a16="http://schemas.microsoft.com/office/drawing/2014/main" val="10005"/>
                   </a:ext>
                 </a:extLst>
               </a:tr>
@@ -8694,7 +8683,7 @@
                 </a:tc>
                 <a:extLst>
                   <a:ext uri="{0D108BD9-81ED-4DB2-BD59-A6C34878D82A}">
-                    <a16:rowId xmlns:a16="http://schemas.microsoft.com/office/drawing/2014/main" xmlns="" val="10006"/>
+                    <a16:rowId xmlns="" xmlns:a16="http://schemas.microsoft.com/office/drawing/2014/main" val="10006"/>
                   </a:ext>
                 </a:extLst>
               </a:tr>
@@ -8842,7 +8831,7 @@
                 </a:tc>
                 <a:extLst>
                   <a:ext uri="{0D108BD9-81ED-4DB2-BD59-A6C34878D82A}">
-                    <a16:rowId xmlns:a16="http://schemas.microsoft.com/office/drawing/2014/main" xmlns="" val="10007"/>
+                    <a16:rowId xmlns="" xmlns:a16="http://schemas.microsoft.com/office/drawing/2014/main" val="10007"/>
                   </a:ext>
                 </a:extLst>
               </a:tr>
@@ -8986,28 +8975,28 @@
                 <a:gridCol w="2016522">
                   <a:extLst>
                     <a:ext uri="{9D8B030D-6E8A-4147-A177-3AD203B41FA5}">
-                      <a16:colId xmlns:a16="http://schemas.microsoft.com/office/drawing/2014/main" xmlns="" val="20000"/>
+                      <a16:colId xmlns="" xmlns:a16="http://schemas.microsoft.com/office/drawing/2014/main" val="20000"/>
                     </a:ext>
                   </a:extLst>
                 </a:gridCol>
                 <a:gridCol w="2016522">
                   <a:extLst>
                     <a:ext uri="{9D8B030D-6E8A-4147-A177-3AD203B41FA5}">
-                      <a16:colId xmlns:a16="http://schemas.microsoft.com/office/drawing/2014/main" xmlns="" val="20001"/>
+                      <a16:colId xmlns="" xmlns:a16="http://schemas.microsoft.com/office/drawing/2014/main" val="20001"/>
                     </a:ext>
                   </a:extLst>
                 </a:gridCol>
                 <a:gridCol w="2016522">
                   <a:extLst>
                     <a:ext uri="{9D8B030D-6E8A-4147-A177-3AD203B41FA5}">
-                      <a16:colId xmlns:a16="http://schemas.microsoft.com/office/drawing/2014/main" xmlns="" val="20002"/>
+                      <a16:colId xmlns="" xmlns:a16="http://schemas.microsoft.com/office/drawing/2014/main" val="20002"/>
                     </a:ext>
                   </a:extLst>
                 </a:gridCol>
                 <a:gridCol w="2016522">
                   <a:extLst>
                     <a:ext uri="{9D8B030D-6E8A-4147-A177-3AD203B41FA5}">
-                      <a16:colId xmlns:a16="http://schemas.microsoft.com/office/drawing/2014/main" xmlns="" val="20003"/>
+                      <a16:colId xmlns="" xmlns:a16="http://schemas.microsoft.com/office/drawing/2014/main" val="20003"/>
                     </a:ext>
                   </a:extLst>
                 </a:gridCol>
@@ -9147,7 +9136,7 @@
                 </a:tc>
                 <a:extLst>
                   <a:ext uri="{0D108BD9-81ED-4DB2-BD59-A6C34878D82A}">
-                    <a16:rowId xmlns:a16="http://schemas.microsoft.com/office/drawing/2014/main" xmlns="" val="10000"/>
+                    <a16:rowId xmlns="" xmlns:a16="http://schemas.microsoft.com/office/drawing/2014/main" val="10000"/>
                   </a:ext>
                 </a:extLst>
               </a:tr>
@@ -9286,7 +9275,7 @@
                 </a:tc>
                 <a:extLst>
                   <a:ext uri="{0D108BD9-81ED-4DB2-BD59-A6C34878D82A}">
-                    <a16:rowId xmlns:a16="http://schemas.microsoft.com/office/drawing/2014/main" xmlns="" val="10001"/>
+                    <a16:rowId xmlns="" xmlns:a16="http://schemas.microsoft.com/office/drawing/2014/main" val="10001"/>
                   </a:ext>
                 </a:extLst>
               </a:tr>
@@ -9425,7 +9414,7 @@
                 </a:tc>
                 <a:extLst>
                   <a:ext uri="{0D108BD9-81ED-4DB2-BD59-A6C34878D82A}">
-                    <a16:rowId xmlns:a16="http://schemas.microsoft.com/office/drawing/2014/main" xmlns="" val="10002"/>
+                    <a16:rowId xmlns="" xmlns:a16="http://schemas.microsoft.com/office/drawing/2014/main" val="10002"/>
                   </a:ext>
                 </a:extLst>
               </a:tr>
@@ -9572,7 +9561,7 @@
                 </a:tc>
                 <a:extLst>
                   <a:ext uri="{0D108BD9-81ED-4DB2-BD59-A6C34878D82A}">
-                    <a16:rowId xmlns:a16="http://schemas.microsoft.com/office/drawing/2014/main" xmlns="" val="10003"/>
+                    <a16:rowId xmlns="" xmlns:a16="http://schemas.microsoft.com/office/drawing/2014/main" val="10003"/>
                   </a:ext>
                 </a:extLst>
               </a:tr>
@@ -9719,7 +9708,7 @@
                 </a:tc>
                 <a:extLst>
                   <a:ext uri="{0D108BD9-81ED-4DB2-BD59-A6C34878D82A}">
-                    <a16:rowId xmlns:a16="http://schemas.microsoft.com/office/drawing/2014/main" xmlns="" val="10004"/>
+                    <a16:rowId xmlns="" xmlns:a16="http://schemas.microsoft.com/office/drawing/2014/main" val="10004"/>
                   </a:ext>
                 </a:extLst>
               </a:tr>
@@ -9858,7 +9847,7 @@
                 </a:tc>
                 <a:extLst>
                   <a:ext uri="{0D108BD9-81ED-4DB2-BD59-A6C34878D82A}">
-                    <a16:rowId xmlns:a16="http://schemas.microsoft.com/office/drawing/2014/main" xmlns="" val="10005"/>
+                    <a16:rowId xmlns="" xmlns:a16="http://schemas.microsoft.com/office/drawing/2014/main" val="10005"/>
                   </a:ext>
                 </a:extLst>
               </a:tr>
@@ -10001,7 +9990,7 @@
                 </a:tc>
                 <a:extLst>
                   <a:ext uri="{0D108BD9-81ED-4DB2-BD59-A6C34878D82A}">
-                    <a16:rowId xmlns:a16="http://schemas.microsoft.com/office/drawing/2014/main" xmlns="" val="10006"/>
+                    <a16:rowId xmlns="" xmlns:a16="http://schemas.microsoft.com/office/drawing/2014/main" val="10006"/>
                   </a:ext>
                 </a:extLst>
               </a:tr>
@@ -10256,14 +10245,14 @@
                 <a:gridCol w="4033044">
                   <a:extLst>
                     <a:ext uri="{9D8B030D-6E8A-4147-A177-3AD203B41FA5}">
-                      <a16:colId xmlns:a16="http://schemas.microsoft.com/office/drawing/2014/main" xmlns="" val="20000"/>
+                      <a16:colId xmlns="" xmlns:a16="http://schemas.microsoft.com/office/drawing/2014/main" val="20000"/>
                     </a:ext>
                   </a:extLst>
                 </a:gridCol>
                 <a:gridCol w="4033044">
                   <a:extLst>
                     <a:ext uri="{9D8B030D-6E8A-4147-A177-3AD203B41FA5}">
-                      <a16:colId xmlns:a16="http://schemas.microsoft.com/office/drawing/2014/main" xmlns="" val="20001"/>
+                      <a16:colId xmlns="" xmlns:a16="http://schemas.microsoft.com/office/drawing/2014/main" val="20001"/>
                     </a:ext>
                   </a:extLst>
                 </a:gridCol>
@@ -10589,7 +10578,7 @@
                 </a:tc>
                 <a:extLst>
                   <a:ext uri="{0D108BD9-81ED-4DB2-BD59-A6C34878D82A}">
-                    <a16:rowId xmlns:a16="http://schemas.microsoft.com/office/drawing/2014/main" xmlns="" val="10000"/>
+                    <a16:rowId xmlns="" xmlns:a16="http://schemas.microsoft.com/office/drawing/2014/main" val="10000"/>
                   </a:ext>
                 </a:extLst>
               </a:tr>
@@ -11755,27 +11744,7 @@
                 <a:latin typeface="Courier New" panose="02070309020205020404" pitchFamily="49" charset="0"/>
                 <a:cs typeface="Courier New" panose="02070309020205020404" pitchFamily="49" charset="0"/>
               </a:rPr>
-              <a:t>Zak says there’s something called hoisting. But basically </a:t>
-            </a:r>
-            <a:r>
-              <a:rPr lang="en-US" sz="1200" dirty="0" smtClean="0">
-                <a:solidFill>
-                  <a:schemeClr val="tx1"/>
-                </a:solidFill>
-                <a:latin typeface="Courier New" panose="02070309020205020404" pitchFamily="49" charset="0"/>
-                <a:cs typeface="Courier New" panose="02070309020205020404" pitchFamily="49" charset="0"/>
-              </a:rPr>
-              <a:t>declare </a:t>
-            </a:r>
-            <a:r>
-              <a:rPr lang="en-US" sz="1200" dirty="0" smtClean="0">
-                <a:solidFill>
-                  <a:schemeClr val="tx1"/>
-                </a:solidFill>
-                <a:latin typeface="Courier New" panose="02070309020205020404" pitchFamily="49" charset="0"/>
-                <a:cs typeface="Courier New" panose="02070309020205020404" pitchFamily="49" charset="0"/>
-              </a:rPr>
-              <a:t>all your variables at the top.</a:t>
+              <a:t>Zak says there’s something called hoisting. But basically declare all your variables at the top.</a:t>
             </a:r>
             <a:endParaRPr lang="en-US" sz="1200" dirty="0">
               <a:solidFill>
@@ -14797,7 +14766,15 @@
             </a:r>
             <a:r>
               <a:rPr lang="en-US" sz="1600" dirty="0"/>
-              <a:t> data type has only one value in JavaScript: null. A variable that contains null contains no valid Number, String, Boolean, Array, Object, etc. You can erase the contents of a variable (without deleting the variable) by assigning it the null value.</a:t>
+              <a:t> data type has only one value in JavaScript: null. A variable that contains null contains no valid Number, String, Boolean, Array, Object, etc. You can erase the contents of a variable (without deleting the variable) by assigning it the null </a:t>
+            </a:r>
+            <a:r>
+              <a:rPr lang="en-US" sz="1600" dirty="0" smtClean="0"/>
+              <a:t>value</a:t>
+            </a:r>
+            <a:r>
+              <a:rPr lang="en-US" sz="1600" dirty="0"/>
+              <a:t>.</a:t>
             </a:r>
             <a:br>
               <a:rPr lang="en-US" sz="1600" dirty="0"/>
@@ -16228,21 +16205,21 @@
                 <a:gridCol w="4064000">
                   <a:extLst>
                     <a:ext uri="{9D8B030D-6E8A-4147-A177-3AD203B41FA5}">
-                      <a16:colId xmlns:a16="http://schemas.microsoft.com/office/drawing/2014/main" xmlns="" val="20000"/>
+                      <a16:colId xmlns="" xmlns:a16="http://schemas.microsoft.com/office/drawing/2014/main" val="20000"/>
                     </a:ext>
                   </a:extLst>
                 </a:gridCol>
                 <a:gridCol w="4064000">
                   <a:extLst>
                     <a:ext uri="{9D8B030D-6E8A-4147-A177-3AD203B41FA5}">
-                      <a16:colId xmlns:a16="http://schemas.microsoft.com/office/drawing/2014/main" xmlns="" val="20001"/>
+                      <a16:colId xmlns="" xmlns:a16="http://schemas.microsoft.com/office/drawing/2014/main" val="20001"/>
                     </a:ext>
                   </a:extLst>
                 </a:gridCol>
                 <a:gridCol w="4064000">
                   <a:extLst>
                     <a:ext uri="{9D8B030D-6E8A-4147-A177-3AD203B41FA5}">
-                      <a16:colId xmlns:a16="http://schemas.microsoft.com/office/drawing/2014/main" xmlns="" val="20002"/>
+                      <a16:colId xmlns="" xmlns:a16="http://schemas.microsoft.com/office/drawing/2014/main" val="20002"/>
                     </a:ext>
                   </a:extLst>
                 </a:gridCol>
@@ -16352,7 +16329,7 @@
                 </a:tc>
                 <a:extLst>
                   <a:ext uri="{0D108BD9-81ED-4DB2-BD59-A6C34878D82A}">
-                    <a16:rowId xmlns:a16="http://schemas.microsoft.com/office/drawing/2014/main" xmlns="" val="10000"/>
+                    <a16:rowId xmlns="" xmlns:a16="http://schemas.microsoft.com/office/drawing/2014/main" val="10000"/>
                   </a:ext>
                 </a:extLst>
               </a:tr>
@@ -16478,7 +16455,7 @@
                 </a:tc>
                 <a:extLst>
                   <a:ext uri="{0D108BD9-81ED-4DB2-BD59-A6C34878D82A}">
-                    <a16:rowId xmlns:a16="http://schemas.microsoft.com/office/drawing/2014/main" xmlns="" val="10001"/>
+                    <a16:rowId xmlns="" xmlns:a16="http://schemas.microsoft.com/office/drawing/2014/main" val="10001"/>
                   </a:ext>
                 </a:extLst>
               </a:tr>
@@ -16634,7 +16611,7 @@
                 </a:tc>
                 <a:extLst>
                   <a:ext uri="{0D108BD9-81ED-4DB2-BD59-A6C34878D82A}">
-                    <a16:rowId xmlns:a16="http://schemas.microsoft.com/office/drawing/2014/main" xmlns="" val="10002"/>
+                    <a16:rowId xmlns="" xmlns:a16="http://schemas.microsoft.com/office/drawing/2014/main" val="10002"/>
                   </a:ext>
                 </a:extLst>
               </a:tr>
@@ -16795,7 +16772,7 @@
                 </a:tc>
                 <a:extLst>
                   <a:ext uri="{0D108BD9-81ED-4DB2-BD59-A6C34878D82A}">
-                    <a16:rowId xmlns:a16="http://schemas.microsoft.com/office/drawing/2014/main" xmlns="" val="10003"/>
+                    <a16:rowId xmlns="" xmlns:a16="http://schemas.microsoft.com/office/drawing/2014/main" val="10003"/>
                   </a:ext>
                 </a:extLst>
               </a:tr>
@@ -16956,7 +16933,7 @@
                 </a:tc>
                 <a:extLst>
                   <a:ext uri="{0D108BD9-81ED-4DB2-BD59-A6C34878D82A}">
-                    <a16:rowId xmlns:a16="http://schemas.microsoft.com/office/drawing/2014/main" xmlns="" val="10004"/>
+                    <a16:rowId xmlns="" xmlns:a16="http://schemas.microsoft.com/office/drawing/2014/main" val="10004"/>
                   </a:ext>
                 </a:extLst>
               </a:tr>
@@ -17117,7 +17094,7 @@
                 </a:tc>
                 <a:extLst>
                   <a:ext uri="{0D108BD9-81ED-4DB2-BD59-A6C34878D82A}">
-                    <a16:rowId xmlns:a16="http://schemas.microsoft.com/office/drawing/2014/main" xmlns="" val="10005"/>
+                    <a16:rowId xmlns="" xmlns:a16="http://schemas.microsoft.com/office/drawing/2014/main" val="10005"/>
                   </a:ext>
                 </a:extLst>
               </a:tr>
@@ -17264,21 +17241,21 @@
                 <a:gridCol w="4064000">
                   <a:extLst>
                     <a:ext uri="{9D8B030D-6E8A-4147-A177-3AD203B41FA5}">
-                      <a16:colId xmlns:a16="http://schemas.microsoft.com/office/drawing/2014/main" xmlns="" val="20000"/>
+                      <a16:colId xmlns="" xmlns:a16="http://schemas.microsoft.com/office/drawing/2014/main" val="20000"/>
                     </a:ext>
                   </a:extLst>
                 </a:gridCol>
                 <a:gridCol w="4064000">
                   <a:extLst>
                     <a:ext uri="{9D8B030D-6E8A-4147-A177-3AD203B41FA5}">
-                      <a16:colId xmlns:a16="http://schemas.microsoft.com/office/drawing/2014/main" xmlns="" val="20001"/>
+                      <a16:colId xmlns="" xmlns:a16="http://schemas.microsoft.com/office/drawing/2014/main" val="20001"/>
                     </a:ext>
                   </a:extLst>
                 </a:gridCol>
                 <a:gridCol w="4064000">
                   <a:extLst>
                     <a:ext uri="{9D8B030D-6E8A-4147-A177-3AD203B41FA5}">
-                      <a16:colId xmlns:a16="http://schemas.microsoft.com/office/drawing/2014/main" xmlns="" val="20002"/>
+                      <a16:colId xmlns="" xmlns:a16="http://schemas.microsoft.com/office/drawing/2014/main" val="20002"/>
                     </a:ext>
                   </a:extLst>
                 </a:gridCol>
@@ -17388,7 +17365,7 @@
                 </a:tc>
                 <a:extLst>
                   <a:ext uri="{0D108BD9-81ED-4DB2-BD59-A6C34878D82A}">
-                    <a16:rowId xmlns:a16="http://schemas.microsoft.com/office/drawing/2014/main" xmlns="" val="10000"/>
+                    <a16:rowId xmlns="" xmlns:a16="http://schemas.microsoft.com/office/drawing/2014/main" val="10000"/>
                   </a:ext>
                 </a:extLst>
               </a:tr>
@@ -17514,7 +17491,7 @@
                 </a:tc>
                 <a:extLst>
                   <a:ext uri="{0D108BD9-81ED-4DB2-BD59-A6C34878D82A}">
-                    <a16:rowId xmlns:a16="http://schemas.microsoft.com/office/drawing/2014/main" xmlns="" val="10001"/>
+                    <a16:rowId xmlns="" xmlns:a16="http://schemas.microsoft.com/office/drawing/2014/main" val="10001"/>
                   </a:ext>
                 </a:extLst>
               </a:tr>
@@ -17657,7 +17634,7 @@
                 </a:tc>
                 <a:extLst>
                   <a:ext uri="{0D108BD9-81ED-4DB2-BD59-A6C34878D82A}">
-                    <a16:rowId xmlns:a16="http://schemas.microsoft.com/office/drawing/2014/main" xmlns="" val="10002"/>
+                    <a16:rowId xmlns="" xmlns:a16="http://schemas.microsoft.com/office/drawing/2014/main" val="10002"/>
                   </a:ext>
                 </a:extLst>
               </a:tr>
@@ -17800,7 +17777,7 @@
                 </a:tc>
                 <a:extLst>
                   <a:ext uri="{0D108BD9-81ED-4DB2-BD59-A6C34878D82A}">
-                    <a16:rowId xmlns:a16="http://schemas.microsoft.com/office/drawing/2014/main" xmlns="" val="10003"/>
+                    <a16:rowId xmlns="" xmlns:a16="http://schemas.microsoft.com/office/drawing/2014/main" val="10003"/>
                   </a:ext>
                 </a:extLst>
               </a:tr>
@@ -17943,7 +17920,7 @@
                 </a:tc>
                 <a:extLst>
                   <a:ext uri="{0D108BD9-81ED-4DB2-BD59-A6C34878D82A}">
-                    <a16:rowId xmlns:a16="http://schemas.microsoft.com/office/drawing/2014/main" xmlns="" val="10004"/>
+                    <a16:rowId xmlns="" xmlns:a16="http://schemas.microsoft.com/office/drawing/2014/main" val="10004"/>
                   </a:ext>
                 </a:extLst>
               </a:tr>
@@ -18086,7 +18063,7 @@
                 </a:tc>
                 <a:extLst>
                   <a:ext uri="{0D108BD9-81ED-4DB2-BD59-A6C34878D82A}">
-                    <a16:rowId xmlns:a16="http://schemas.microsoft.com/office/drawing/2014/main" xmlns="" val="10005"/>
+                    <a16:rowId xmlns="" xmlns:a16="http://schemas.microsoft.com/office/drawing/2014/main" val="10005"/>
                   </a:ext>
                 </a:extLst>
               </a:tr>
@@ -18214,7 +18191,7 @@
           <p:nvPr>
             <p:extLst>
               <p:ext uri="{D42A27DB-BD31-4B8C-83A1-F6EECF244321}">
-                <p14:modId xmlns:p14="http://schemas.microsoft.com/office/powerpoint/2010/main" val="2981264253"/>
+                <p14:modId xmlns:p14="http://schemas.microsoft.com/office/powerpoint/2010/main" val="3335827378"/>
               </p:ext>
             </p:extLst>
           </p:nvPr>
@@ -18233,21 +18210,21 @@
                 <a:gridCol w="3020786">
                   <a:extLst>
                     <a:ext uri="{9D8B030D-6E8A-4147-A177-3AD203B41FA5}">
-                      <a16:colId xmlns:a16="http://schemas.microsoft.com/office/drawing/2014/main" xmlns="" val="20000"/>
+                      <a16:colId xmlns="" xmlns:a16="http://schemas.microsoft.com/office/drawing/2014/main" val="20000"/>
                     </a:ext>
                   </a:extLst>
                 </a:gridCol>
                 <a:gridCol w="4082143">
                   <a:extLst>
                     <a:ext uri="{9D8B030D-6E8A-4147-A177-3AD203B41FA5}">
-                      <a16:colId xmlns:a16="http://schemas.microsoft.com/office/drawing/2014/main" xmlns="" val="20001"/>
+                      <a16:colId xmlns="" xmlns:a16="http://schemas.microsoft.com/office/drawing/2014/main" val="20001"/>
                     </a:ext>
                   </a:extLst>
                 </a:gridCol>
                 <a:gridCol w="5089071">
                   <a:extLst>
                     <a:ext uri="{9D8B030D-6E8A-4147-A177-3AD203B41FA5}">
-                      <a16:colId xmlns:a16="http://schemas.microsoft.com/office/drawing/2014/main" xmlns="" val="20002"/>
+                      <a16:colId xmlns="" xmlns:a16="http://schemas.microsoft.com/office/drawing/2014/main" val="20002"/>
                     </a:ext>
                   </a:extLst>
                 </a:gridCol>
@@ -18357,7 +18334,7 @@
                 </a:tc>
                 <a:extLst>
                   <a:ext uri="{0D108BD9-81ED-4DB2-BD59-A6C34878D82A}">
-                    <a16:rowId xmlns:a16="http://schemas.microsoft.com/office/drawing/2014/main" xmlns="" val="10000"/>
+                    <a16:rowId xmlns="" xmlns:a16="http://schemas.microsoft.com/office/drawing/2014/main" val="10000"/>
                   </a:ext>
                 </a:extLst>
               </a:tr>
@@ -18536,7 +18513,7 @@
                 </a:tc>
                 <a:extLst>
                   <a:ext uri="{0D108BD9-81ED-4DB2-BD59-A6C34878D82A}">
-                    <a16:rowId xmlns:a16="http://schemas.microsoft.com/office/drawing/2014/main" xmlns="" val="10001"/>
+                    <a16:rowId xmlns="" xmlns:a16="http://schemas.microsoft.com/office/drawing/2014/main" val="10001"/>
                   </a:ext>
                 </a:extLst>
               </a:tr>
@@ -18649,7 +18626,7 @@
                 </a:tc>
                 <a:extLst>
                   <a:ext uri="{0D108BD9-81ED-4DB2-BD59-A6C34878D82A}">
-                    <a16:rowId xmlns:a16="http://schemas.microsoft.com/office/drawing/2014/main" xmlns="" val="10002"/>
+                    <a16:rowId xmlns="" xmlns:a16="http://schemas.microsoft.com/office/drawing/2014/main" val="10002"/>
                   </a:ext>
                 </a:extLst>
               </a:tr>
@@ -18828,7 +18805,7 @@
                 </a:tc>
                 <a:extLst>
                   <a:ext uri="{0D108BD9-81ED-4DB2-BD59-A6C34878D82A}">
-                    <a16:rowId xmlns:a16="http://schemas.microsoft.com/office/drawing/2014/main" xmlns="" val="10003"/>
+                    <a16:rowId xmlns="" xmlns:a16="http://schemas.microsoft.com/office/drawing/2014/main" val="10003"/>
                   </a:ext>
                 </a:extLst>
               </a:tr>
@@ -18936,7 +18913,7 @@
                 </a:tc>
                 <a:extLst>
                   <a:ext uri="{0D108BD9-81ED-4DB2-BD59-A6C34878D82A}">
-                    <a16:rowId xmlns:a16="http://schemas.microsoft.com/office/drawing/2014/main" xmlns="" val="10004"/>
+                    <a16:rowId xmlns="" xmlns:a16="http://schemas.microsoft.com/office/drawing/2014/main" val="10004"/>
                   </a:ext>
                 </a:extLst>
               </a:tr>
@@ -19120,7 +19097,7 @@
                 </a:tc>
                 <a:extLst>
                   <a:ext uri="{0D108BD9-81ED-4DB2-BD59-A6C34878D82A}">
-                    <a16:rowId xmlns:a16="http://schemas.microsoft.com/office/drawing/2014/main" xmlns="" val="10005"/>
+                    <a16:rowId xmlns="" xmlns:a16="http://schemas.microsoft.com/office/drawing/2014/main" val="10005"/>
                   </a:ext>
                 </a:extLst>
               </a:tr>
@@ -19233,7 +19210,7 @@
                 </a:tc>
                 <a:extLst>
                   <a:ext uri="{0D108BD9-81ED-4DB2-BD59-A6C34878D82A}">
-                    <a16:rowId xmlns:a16="http://schemas.microsoft.com/office/drawing/2014/main" xmlns="" val="10006"/>
+                    <a16:rowId xmlns="" xmlns:a16="http://schemas.microsoft.com/office/drawing/2014/main" val="10006"/>
                   </a:ext>
                 </a:extLst>
               </a:tr>
@@ -19352,7 +19329,43 @@
                           <a:ea typeface="+mn-ea"/>
                           <a:cs typeface="Courier New" panose="02070309020205020404" pitchFamily="49" charset="0"/>
                         </a:rPr>
-                        <a:t>null == undefined        // returns true</a:t>
+                        <a:t>null </a:t>
+                      </a:r>
+                      <a:r>
+                        <a:rPr lang="en-US" sz="1400" b="0" i="0" kern="1200" dirty="0" smtClean="0">
+                          <a:solidFill>
+                            <a:srgbClr val="FF0000"/>
+                          </a:solidFill>
+                          <a:effectLst/>
+                          <a:latin typeface="Courier New" panose="02070309020205020404" pitchFamily="49" charset="0"/>
+                          <a:ea typeface="+mn-ea"/>
+                          <a:cs typeface="Courier New" panose="02070309020205020404" pitchFamily="49" charset="0"/>
+                        </a:rPr>
+                        <a:t>!</a:t>
+                      </a:r>
+                      <a:r>
+                        <a:rPr lang="en-US" sz="1400" b="0" i="0" kern="1200" dirty="0" smtClean="0">
+                          <a:solidFill>
+                            <a:schemeClr val="dk1"/>
+                          </a:solidFill>
+                          <a:effectLst/>
+                          <a:latin typeface="Courier New" panose="02070309020205020404" pitchFamily="49" charset="0"/>
+                          <a:ea typeface="+mn-ea"/>
+                          <a:cs typeface="Courier New" panose="02070309020205020404" pitchFamily="49" charset="0"/>
+                        </a:rPr>
+                        <a:t>=</a:t>
+                      </a:r>
+                      <a:r>
+                        <a:rPr lang="en-US" sz="1400" b="0" i="0" kern="1200" dirty="0">
+                          <a:solidFill>
+                            <a:schemeClr val="dk1"/>
+                          </a:solidFill>
+                          <a:effectLst/>
+                          <a:latin typeface="Courier New" panose="02070309020205020404" pitchFamily="49" charset="0"/>
+                          <a:ea typeface="+mn-ea"/>
+                          <a:cs typeface="Courier New" panose="02070309020205020404" pitchFamily="49" charset="0"/>
+                        </a:rPr>
+                        <a:t>= undefined        // returns true</a:t>
                       </a:r>
                       <a:endParaRPr lang="en-US" sz="1400" dirty="0">
                         <a:latin typeface="Courier New" pitchFamily="49" charset="0"/>
@@ -19388,7 +19401,7 @@
                 </a:tc>
                 <a:extLst>
                   <a:ext uri="{0D108BD9-81ED-4DB2-BD59-A6C34878D82A}">
-                    <a16:rowId xmlns:a16="http://schemas.microsoft.com/office/drawing/2014/main" xmlns="" val="10007"/>
+                    <a16:rowId xmlns="" xmlns:a16="http://schemas.microsoft.com/office/drawing/2014/main" val="10007"/>
                   </a:ext>
                 </a:extLst>
               </a:tr>
@@ -19488,7 +19501,7 @@
                 </a:tc>
                 <a:extLst>
                   <a:ext uri="{0D108BD9-81ED-4DB2-BD59-A6C34878D82A}">
-                    <a16:rowId xmlns:a16="http://schemas.microsoft.com/office/drawing/2014/main" xmlns="" val="10008"/>
+                    <a16:rowId xmlns="" xmlns:a16="http://schemas.microsoft.com/office/drawing/2014/main" val="10008"/>
                   </a:ext>
                 </a:extLst>
               </a:tr>
@@ -19527,6 +19540,45 @@
               <a:t>sign. It requires the value AND the type to be same</a:t>
             </a:r>
             <a:endParaRPr lang="en-US" dirty="0"/>
+          </a:p>
+        </p:txBody>
+      </p:sp>
+      <p:sp>
+        <p:nvSpPr>
+          <p:cNvPr id="4" name="Rectangle 3"/>
+          <p:cNvSpPr/>
+          <p:nvPr/>
+        </p:nvSpPr>
+        <p:spPr>
+          <a:xfrm>
+            <a:off x="7051325" y="5392837"/>
+            <a:ext cx="5140675" cy="307777"/>
+          </a:xfrm>
+          <a:prstGeom prst="rect">
+            <a:avLst/>
+          </a:prstGeom>
+        </p:spPr>
+        <p:txBody>
+          <a:bodyPr wrap="none">
+            <a:spAutoFit/>
+          </a:bodyPr>
+          <a:lstStyle/>
+          <a:p>
+            <a:r>
+              <a:rPr lang="en-US" sz="1400" dirty="0" smtClean="0">
+                <a:solidFill>
+                  <a:srgbClr val="FF0000"/>
+                </a:solidFill>
+                <a:latin typeface="Courier New" panose="02070309020205020404" pitchFamily="49" charset="0"/>
+                <a:cs typeface="Courier New" panose="02070309020205020404" pitchFamily="49" charset="0"/>
+              </a:rPr>
+              <a:t>I added this ! Because I think Zak left it out </a:t>
+            </a:r>
+            <a:endParaRPr lang="en-US" dirty="0">
+              <a:solidFill>
+                <a:srgbClr val="FF0000"/>
+              </a:solidFill>
+            </a:endParaRPr>
           </a:p>
         </p:txBody>
       </p:sp>
@@ -20188,21 +20240,21 @@
                 <a:gridCol w="4064000">
                   <a:extLst>
                     <a:ext uri="{9D8B030D-6E8A-4147-A177-3AD203B41FA5}">
-                      <a16:colId xmlns:a16="http://schemas.microsoft.com/office/drawing/2014/main" xmlns="" val="20000"/>
+                      <a16:colId xmlns="" xmlns:a16="http://schemas.microsoft.com/office/drawing/2014/main" val="20000"/>
                     </a:ext>
                   </a:extLst>
                 </a:gridCol>
                 <a:gridCol w="2732585">
                   <a:extLst>
                     <a:ext uri="{9D8B030D-6E8A-4147-A177-3AD203B41FA5}">
-                      <a16:colId xmlns:a16="http://schemas.microsoft.com/office/drawing/2014/main" xmlns="" val="20001"/>
+                      <a16:colId xmlns="" xmlns:a16="http://schemas.microsoft.com/office/drawing/2014/main" val="20001"/>
                     </a:ext>
                   </a:extLst>
                 </a:gridCol>
                 <a:gridCol w="5395415">
                   <a:extLst>
                     <a:ext uri="{9D8B030D-6E8A-4147-A177-3AD203B41FA5}">
-                      <a16:colId xmlns:a16="http://schemas.microsoft.com/office/drawing/2014/main" xmlns="" val="20002"/>
+                      <a16:colId xmlns="" xmlns:a16="http://schemas.microsoft.com/office/drawing/2014/main" val="20002"/>
                     </a:ext>
                   </a:extLst>
                 </a:gridCol>
@@ -20312,7 +20364,7 @@
                 </a:tc>
                 <a:extLst>
                   <a:ext uri="{0D108BD9-81ED-4DB2-BD59-A6C34878D82A}">
-                    <a16:rowId xmlns:a16="http://schemas.microsoft.com/office/drawing/2014/main" xmlns="" val="10000"/>
+                    <a16:rowId xmlns="" xmlns:a16="http://schemas.microsoft.com/office/drawing/2014/main" val="10000"/>
                   </a:ext>
                 </a:extLst>
               </a:tr>
@@ -20513,7 +20565,7 @@
                 </a:tc>
                 <a:extLst>
                   <a:ext uri="{0D108BD9-81ED-4DB2-BD59-A6C34878D82A}">
-                    <a16:rowId xmlns:a16="http://schemas.microsoft.com/office/drawing/2014/main" xmlns="" val="10001"/>
+                    <a16:rowId xmlns="" xmlns:a16="http://schemas.microsoft.com/office/drawing/2014/main" val="10001"/>
                   </a:ext>
                 </a:extLst>
               </a:tr>
@@ -20731,7 +20783,7 @@
                 </a:tc>
                 <a:extLst>
                   <a:ext uri="{0D108BD9-81ED-4DB2-BD59-A6C34878D82A}">
-                    <a16:rowId xmlns:a16="http://schemas.microsoft.com/office/drawing/2014/main" xmlns="" val="10002"/>
+                    <a16:rowId xmlns="" xmlns:a16="http://schemas.microsoft.com/office/drawing/2014/main" val="10002"/>
                   </a:ext>
                 </a:extLst>
               </a:tr>
@@ -20878,21 +20930,21 @@
                 <a:gridCol w="4064000">
                   <a:extLst>
                     <a:ext uri="{9D8B030D-6E8A-4147-A177-3AD203B41FA5}">
-                      <a16:colId xmlns:a16="http://schemas.microsoft.com/office/drawing/2014/main" xmlns="" val="20000"/>
+                      <a16:colId xmlns="" xmlns:a16="http://schemas.microsoft.com/office/drawing/2014/main" val="20000"/>
                     </a:ext>
                   </a:extLst>
                 </a:gridCol>
                 <a:gridCol w="3442269">
                   <a:extLst>
                     <a:ext uri="{9D8B030D-6E8A-4147-A177-3AD203B41FA5}">
-                      <a16:colId xmlns:a16="http://schemas.microsoft.com/office/drawing/2014/main" xmlns="" val="20001"/>
+                      <a16:colId xmlns="" xmlns:a16="http://schemas.microsoft.com/office/drawing/2014/main" val="20001"/>
                     </a:ext>
                   </a:extLst>
                 </a:gridCol>
                 <a:gridCol w="4685731">
                   <a:extLst>
                     <a:ext uri="{9D8B030D-6E8A-4147-A177-3AD203B41FA5}">
-                      <a16:colId xmlns:a16="http://schemas.microsoft.com/office/drawing/2014/main" xmlns="" val="20002"/>
+                      <a16:colId xmlns="" xmlns:a16="http://schemas.microsoft.com/office/drawing/2014/main" val="20002"/>
                     </a:ext>
                   </a:extLst>
                 </a:gridCol>
@@ -21002,7 +21054,7 @@
                 </a:tc>
                 <a:extLst>
                   <a:ext uri="{0D108BD9-81ED-4DB2-BD59-A6C34878D82A}">
-                    <a16:rowId xmlns:a16="http://schemas.microsoft.com/office/drawing/2014/main" xmlns="" val="10000"/>
+                    <a16:rowId xmlns="" xmlns:a16="http://schemas.microsoft.com/office/drawing/2014/main" val="10000"/>
                   </a:ext>
                 </a:extLst>
               </a:tr>
@@ -21203,7 +21255,7 @@
                 </a:tc>
                 <a:extLst>
                   <a:ext uri="{0D108BD9-81ED-4DB2-BD59-A6C34878D82A}">
-                    <a16:rowId xmlns:a16="http://schemas.microsoft.com/office/drawing/2014/main" xmlns="" val="10001"/>
+                    <a16:rowId xmlns="" xmlns:a16="http://schemas.microsoft.com/office/drawing/2014/main" val="10001"/>
                   </a:ext>
                 </a:extLst>
               </a:tr>
@@ -21362,21 +21414,21 @@
                 <a:gridCol w="1942214">
                   <a:extLst>
                     <a:ext uri="{9D8B030D-6E8A-4147-A177-3AD203B41FA5}">
-                      <a16:colId xmlns:a16="http://schemas.microsoft.com/office/drawing/2014/main" xmlns="" val="20000"/>
+                      <a16:colId xmlns="" xmlns:a16="http://schemas.microsoft.com/office/drawing/2014/main" val="20000"/>
                     </a:ext>
                   </a:extLst>
                 </a:gridCol>
                 <a:gridCol w="5344633">
                   <a:extLst>
                     <a:ext uri="{9D8B030D-6E8A-4147-A177-3AD203B41FA5}">
-                      <a16:colId xmlns:a16="http://schemas.microsoft.com/office/drawing/2014/main" xmlns="" val="20001"/>
+                      <a16:colId xmlns="" xmlns:a16="http://schemas.microsoft.com/office/drawing/2014/main" val="20001"/>
                     </a:ext>
                   </a:extLst>
                 </a:gridCol>
                 <a:gridCol w="4905153">
                   <a:extLst>
                     <a:ext uri="{9D8B030D-6E8A-4147-A177-3AD203B41FA5}">
-                      <a16:colId xmlns:a16="http://schemas.microsoft.com/office/drawing/2014/main" xmlns="" val="250761912"/>
+                      <a16:colId xmlns="" xmlns:a16="http://schemas.microsoft.com/office/drawing/2014/main" val="250761912"/>
                     </a:ext>
                   </a:extLst>
                 </a:gridCol>
@@ -21486,7 +21538,7 @@
                 </a:tc>
                 <a:extLst>
                   <a:ext uri="{0D108BD9-81ED-4DB2-BD59-A6C34878D82A}">
-                    <a16:rowId xmlns:a16="http://schemas.microsoft.com/office/drawing/2014/main" xmlns="" val="10000"/>
+                    <a16:rowId xmlns="" xmlns:a16="http://schemas.microsoft.com/office/drawing/2014/main" val="10000"/>
                   </a:ext>
                 </a:extLst>
               </a:tr>
@@ -21693,7 +21745,7 @@
                 </a:tc>
                 <a:extLst>
                   <a:ext uri="{0D108BD9-81ED-4DB2-BD59-A6C34878D82A}">
-                    <a16:rowId xmlns:a16="http://schemas.microsoft.com/office/drawing/2014/main" xmlns="" val="10001"/>
+                    <a16:rowId xmlns="" xmlns:a16="http://schemas.microsoft.com/office/drawing/2014/main" val="10001"/>
                   </a:ext>
                 </a:extLst>
               </a:tr>
@@ -21877,7 +21929,7 @@
                 </a:tc>
                 <a:extLst>
                   <a:ext uri="{0D108BD9-81ED-4DB2-BD59-A6C34878D82A}">
-                    <a16:rowId xmlns:a16="http://schemas.microsoft.com/office/drawing/2014/main" xmlns="" val="10002"/>
+                    <a16:rowId xmlns="" xmlns:a16="http://schemas.microsoft.com/office/drawing/2014/main" val="10002"/>
                   </a:ext>
                 </a:extLst>
               </a:tr>
@@ -22044,7 +22096,7 @@
                 </a:tc>
                 <a:extLst>
                   <a:ext uri="{0D108BD9-81ED-4DB2-BD59-A6C34878D82A}">
-                    <a16:rowId xmlns:a16="http://schemas.microsoft.com/office/drawing/2014/main" xmlns="" val="10003"/>
+                    <a16:rowId xmlns="" xmlns:a16="http://schemas.microsoft.com/office/drawing/2014/main" val="10003"/>
                   </a:ext>
                 </a:extLst>
               </a:tr>
@@ -22159,7 +22211,7 @@
                 </a:tc>
                 <a:extLst>
                   <a:ext uri="{0D108BD9-81ED-4DB2-BD59-A6C34878D82A}">
-                    <a16:rowId xmlns:a16="http://schemas.microsoft.com/office/drawing/2014/main" xmlns="" val="10004"/>
+                    <a16:rowId xmlns="" xmlns:a16="http://schemas.microsoft.com/office/drawing/2014/main" val="10004"/>
                   </a:ext>
                 </a:extLst>
               </a:tr>
@@ -22500,7 +22552,7 @@
                 </a:tc>
                 <a:extLst>
                   <a:ext uri="{0D108BD9-81ED-4DB2-BD59-A6C34878D82A}">
-                    <a16:rowId xmlns:a16="http://schemas.microsoft.com/office/drawing/2014/main" xmlns="" val="10005"/>
+                    <a16:rowId xmlns="" xmlns:a16="http://schemas.microsoft.com/office/drawing/2014/main" val="10005"/>
                   </a:ext>
                 </a:extLst>
               </a:tr>
@@ -22615,7 +22667,7 @@
                 </a:tc>
                 <a:extLst>
                   <a:ext uri="{0D108BD9-81ED-4DB2-BD59-A6C34878D82A}">
-                    <a16:rowId xmlns:a16="http://schemas.microsoft.com/office/drawing/2014/main" xmlns="" val="10006"/>
+                    <a16:rowId xmlns="" xmlns:a16="http://schemas.microsoft.com/office/drawing/2014/main" val="10006"/>
                   </a:ext>
                 </a:extLst>
               </a:tr>

</xml_diff>